<commit_message>
add viz and png
</commit_message>
<xml_diff>
--- a/eda_intoduction.pptx
+++ b/eda_intoduction.pptx
@@ -10,13 +10,15 @@
     <p:sldId id="257" r:id="rId4"/>
     <p:sldId id="259" r:id="rId5"/>
     <p:sldId id="261" r:id="rId6"/>
-    <p:sldId id="262" r:id="rId7"/>
-    <p:sldId id="263" r:id="rId8"/>
+    <p:sldId id="263" r:id="rId7"/>
+    <p:sldId id="262" r:id="rId8"/>
     <p:sldId id="264" r:id="rId9"/>
     <p:sldId id="266" r:id="rId10"/>
     <p:sldId id="265" r:id="rId11"/>
     <p:sldId id="267" r:id="rId12"/>
     <p:sldId id="260" r:id="rId13"/>
+    <p:sldId id="268" r:id="rId14"/>
+    <p:sldId id="269" r:id="rId15"/>
   </p:sldIdLst>
   <p:sldSz cx="12192000" cy="6858000"/>
   <p:notesSz cx="6858000" cy="9144000"/>
@@ -115,6 +117,11 @@
       </a:defRPr>
     </a:lvl9pPr>
   </p:defaultTextStyle>
+  <p:extLst>
+    <p:ext uri="{EFAFB233-063F-42B5-8137-9DF3F51BA10A}">
+      <p15:sldGuideLst xmlns:p15="http://schemas.microsoft.com/office/powerpoint/2012/main"/>
+    </p:ext>
+  </p:extLst>
 </p:presentation>
 </file>
 
@@ -521,7 +528,7 @@
           <a:p>
             <a:fld id="{83284890-85D2-4D7B-8EF5-15A9C1DB8F42}" type="datetimeFigureOut">
               <a:rPr lang="en-US" dirty="0"/>
-              <a:t>8/15/2021</a:t>
+              <a:t>8/16/2021</a:t>
             </a:fld>
             <a:endParaRPr lang="en-US" dirty="0"/>
           </a:p>
@@ -696,7 +703,7 @@
           <a:p>
             <a:fld id="{87157CC2-0FC8-4686-B024-99790E0F5162}" type="datetimeFigureOut">
               <a:rPr lang="en-US" dirty="0"/>
-              <a:t>8/15/2021</a:t>
+              <a:t>8/16/2021</a:t>
             </a:fld>
             <a:endParaRPr lang="en-US" dirty="0"/>
           </a:p>
@@ -871,7 +878,7 @@
           <a:p>
             <a:fld id="{F6764DA5-CD3D-4590-A511-FCD3BC7A793E}" type="datetimeFigureOut">
               <a:rPr lang="en-US" dirty="0"/>
-              <a:t>8/15/2021</a:t>
+              <a:t>8/16/2021</a:t>
             </a:fld>
             <a:endParaRPr lang="en-US" dirty="0"/>
           </a:p>
@@ -1036,7 +1043,7 @@
           <a:p>
             <a:fld id="{82F5661D-6934-4B32-B92C-470368BF1EC6}" type="datetimeFigureOut">
               <a:rPr lang="en-US" dirty="0"/>
-              <a:t>8/15/2021</a:t>
+              <a:t>8/16/2021</a:t>
             </a:fld>
             <a:endParaRPr lang="en-US" dirty="0"/>
           </a:p>
@@ -1344,7 +1351,7 @@
           <a:p>
             <a:fld id="{C6F822A4-8DA6-4447-9B1F-C5DB58435268}" type="datetimeFigureOut">
               <a:rPr lang="en-US" dirty="0"/>
-              <a:t>8/15/2021</a:t>
+              <a:t>8/16/2021</a:t>
             </a:fld>
             <a:endParaRPr lang="en-US" dirty="0"/>
           </a:p>
@@ -1726,7 +1733,7 @@
           <a:p>
             <a:fld id="{E548D31E-DCDA-41A7-9C67-C4B11B94D21D}" type="datetimeFigureOut">
               <a:rPr lang="en-US" dirty="0"/>
-              <a:t>8/15/2021</a:t>
+              <a:t>8/16/2021</a:t>
             </a:fld>
             <a:endParaRPr lang="en-US" dirty="0"/>
           </a:p>
@@ -2155,7 +2162,7 @@
           <a:p>
             <a:fld id="{9B3762C0-B258-48F1-ADE6-176B4174CCDD}" type="datetimeFigureOut">
               <a:rPr lang="en-US" dirty="0"/>
-              <a:t>8/15/2021</a:t>
+              <a:t>8/16/2021</a:t>
             </a:fld>
             <a:endParaRPr lang="en-US" dirty="0"/>
           </a:p>
@@ -2268,7 +2275,7 @@
           <a:p>
             <a:fld id="{677919A6-33EB-49BD-A62F-1FA56B9F9712}" type="datetimeFigureOut">
               <a:rPr lang="en-US" dirty="0"/>
-              <a:t>8/15/2021</a:t>
+              <a:t>8/16/2021</a:t>
             </a:fld>
             <a:endParaRPr lang="en-US" dirty="0"/>
           </a:p>
@@ -2358,7 +2365,7 @@
           <a:p>
             <a:fld id="{CA4E7D1B-D673-4CF6-8672-009D42ABD2A0}" type="datetimeFigureOut">
               <a:rPr lang="en-US" dirty="0"/>
-              <a:t>8/15/2021</a:t>
+              <a:t>8/16/2021</a:t>
             </a:fld>
             <a:endParaRPr lang="en-US" dirty="0"/>
           </a:p>
@@ -2703,7 +2710,7 @@
           <a:p>
             <a:fld id="{DA16AA21-1863-4931-97CB-99D0A168701B}" type="datetimeFigureOut">
               <a:rPr lang="en-US" dirty="0"/>
-              <a:t>8/15/2021</a:t>
+              <a:t>8/16/2021</a:t>
             </a:fld>
             <a:endParaRPr lang="en-US" dirty="0"/>
           </a:p>
@@ -3123,7 +3130,7 @@
           <a:p>
             <a:fld id="{3772C379-9A7C-4C87-A116-CBE9F58B04C5}" type="datetimeFigureOut">
               <a:rPr lang="en-US" dirty="0"/>
-              <a:t>8/15/2021</a:t>
+              <a:t>8/16/2021</a:t>
             </a:fld>
             <a:endParaRPr lang="en-US" dirty="0"/>
           </a:p>
@@ -3399,7 +3406,7 @@
           <a:p>
             <a:fld id="{8664C608-40B1-4030-A28D-5B74BC98ADCE}" type="datetimeFigureOut">
               <a:rPr lang="en-US" dirty="0"/>
-              <a:t>8/15/2021</a:t>
+              <a:t>8/16/2021</a:t>
             </a:fld>
             <a:endParaRPr lang="en-US" dirty="0"/>
           </a:p>
@@ -4338,15 +4345,22 @@
             <p:ph type="title"/>
           </p:nvPr>
         </p:nvSpPr>
-        <p:spPr/>
-        <p:txBody>
-          <a:bodyPr/>
+        <p:spPr>
+          <a:xfrm>
+            <a:off x="2450236" y="208058"/>
+            <a:ext cx="8837809" cy="621792"/>
+          </a:xfrm>
+        </p:spPr>
+        <p:txBody>
+          <a:bodyPr>
+            <a:normAutofit fontScale="90000"/>
+          </a:bodyPr>
           <a:lstStyle/>
           <a:p>
             <a:pPr algn="r"/>
             <a:r>
               <a:rPr lang="he-IL" dirty="0"/>
-              <a:t>השלמת ערכים חסרים</a:t>
+              <a:t>היכרות עם הנתונים</a:t>
             </a:r>
           </a:p>
         </p:txBody>
@@ -4367,22 +4381,315 @@
             <p:ph idx="1"/>
           </p:nvPr>
         </p:nvSpPr>
-        <p:spPr/>
+        <p:spPr>
+          <a:xfrm>
+            <a:off x="2072934" y="935548"/>
+            <a:ext cx="9592411" cy="621792"/>
+          </a:xfrm>
+        </p:spPr>
         <p:txBody>
           <a:bodyPr/>
           <a:lstStyle/>
           <a:p>
-            <a:pPr marL="0" indent="0">
-              <a:buNone/>
-            </a:pPr>
-            <a:endParaRPr lang="he-IL" dirty="0"/>
-          </a:p>
-        </p:txBody>
-      </p:sp>
+            <a:r>
+              <a:rPr lang="he-IL" dirty="0"/>
+              <a:t>צפיפות תדירות הפעמים שקשישים פונים כפונקציה של סוג הדיור</a:t>
+            </a:r>
+          </a:p>
+        </p:txBody>
+      </p:sp>
+      <p:pic>
+        <p:nvPicPr>
+          <p:cNvPr id="7" name="תמונה 6">
+            <a:extLst>
+              <a:ext uri="{FF2B5EF4-FFF2-40B4-BE49-F238E27FC236}">
+                <a16:creationId xmlns:a16="http://schemas.microsoft.com/office/drawing/2014/main" id="{FD747EB7-3D73-45E6-A89D-D029AE24111A}"/>
+              </a:ext>
+            </a:extLst>
+          </p:cNvPr>
+          <p:cNvPicPr>
+            <a:picLocks noChangeAspect="1"/>
+          </p:cNvPicPr>
+          <p:nvPr/>
+        </p:nvPicPr>
+        <p:blipFill>
+          <a:blip r:embed="rId2"/>
+          <a:stretch>
+            <a:fillRect/>
+          </a:stretch>
+        </p:blipFill>
+        <p:spPr>
+          <a:xfrm>
+            <a:off x="2725445" y="1349282"/>
+            <a:ext cx="5442011" cy="5300660"/>
+          </a:xfrm>
+          <a:prstGeom prst="rect">
+            <a:avLst/>
+          </a:prstGeom>
+        </p:spPr>
+      </p:pic>
     </p:spTree>
     <p:extLst>
       <p:ext uri="{BB962C8B-B14F-4D97-AF65-F5344CB8AC3E}">
         <p14:creationId xmlns:p14="http://schemas.microsoft.com/office/powerpoint/2010/main" val="3549496148"/>
+      </p:ext>
+    </p:extLst>
+  </p:cSld>
+  <p:clrMapOvr>
+    <a:masterClrMapping/>
+  </p:clrMapOvr>
+</p:sld>
+</file>
+
+<file path=ppt/slides/slide13.xml><?xml version="1.0" encoding="utf-8"?>
+<p:sld xmlns:a="http://schemas.openxmlformats.org/drawingml/2006/main" xmlns:r="http://schemas.openxmlformats.org/officeDocument/2006/relationships" xmlns:p="http://schemas.openxmlformats.org/presentationml/2006/main">
+  <p:cSld>
+    <p:spTree>
+      <p:nvGrpSpPr>
+        <p:cNvPr id="1" name=""/>
+        <p:cNvGrpSpPr/>
+        <p:nvPr/>
+      </p:nvGrpSpPr>
+      <p:grpSpPr>
+        <a:xfrm>
+          <a:off x="0" y="0"/>
+          <a:ext cx="0" cy="0"/>
+          <a:chOff x="0" y="0"/>
+          <a:chExt cx="0" cy="0"/>
+        </a:xfrm>
+      </p:grpSpPr>
+      <p:sp>
+        <p:nvSpPr>
+          <p:cNvPr id="2" name="כותרת 1">
+            <a:extLst>
+              <a:ext uri="{FF2B5EF4-FFF2-40B4-BE49-F238E27FC236}">
+                <a16:creationId xmlns:a16="http://schemas.microsoft.com/office/drawing/2014/main" id="{8B6FA5E4-5DE8-4151-B116-721BDBBDD21A}"/>
+              </a:ext>
+            </a:extLst>
+          </p:cNvPr>
+          <p:cNvSpPr>
+            <a:spLocks noGrp="1"/>
+          </p:cNvSpPr>
+          <p:nvPr>
+            <p:ph type="title"/>
+          </p:nvPr>
+        </p:nvSpPr>
+        <p:spPr>
+          <a:xfrm>
+            <a:off x="2450236" y="208058"/>
+            <a:ext cx="8837809" cy="621792"/>
+          </a:xfrm>
+        </p:spPr>
+        <p:txBody>
+          <a:bodyPr>
+            <a:normAutofit fontScale="90000"/>
+          </a:bodyPr>
+          <a:lstStyle/>
+          <a:p>
+            <a:pPr algn="r"/>
+            <a:r>
+              <a:rPr lang="he-IL" dirty="0"/>
+              <a:t>היכרות עם הנתונים</a:t>
+            </a:r>
+          </a:p>
+        </p:txBody>
+      </p:sp>
+      <p:sp>
+        <p:nvSpPr>
+          <p:cNvPr id="3" name="מציין מיקום תוכן 2">
+            <a:extLst>
+              <a:ext uri="{FF2B5EF4-FFF2-40B4-BE49-F238E27FC236}">
+                <a16:creationId xmlns:a16="http://schemas.microsoft.com/office/drawing/2014/main" id="{F503CA34-A7B7-401C-BF52-FF4FF88F04B5}"/>
+              </a:ext>
+            </a:extLst>
+          </p:cNvPr>
+          <p:cNvSpPr>
+            <a:spLocks noGrp="1"/>
+          </p:cNvSpPr>
+          <p:nvPr>
+            <p:ph idx="1"/>
+          </p:nvPr>
+        </p:nvSpPr>
+        <p:spPr>
+          <a:xfrm>
+            <a:off x="2072934" y="935548"/>
+            <a:ext cx="9592411" cy="621792"/>
+          </a:xfrm>
+        </p:spPr>
+        <p:txBody>
+          <a:bodyPr/>
+          <a:lstStyle/>
+          <a:p>
+            <a:r>
+              <a:rPr lang="he-IL" dirty="0"/>
+              <a:t>צפיפות תדירות הפעמים שקשישים פונים כפונקציה של המגדר</a:t>
+            </a:r>
+          </a:p>
+        </p:txBody>
+      </p:sp>
+      <p:pic>
+        <p:nvPicPr>
+          <p:cNvPr id="8" name="תמונה 7">
+            <a:extLst>
+              <a:ext uri="{FF2B5EF4-FFF2-40B4-BE49-F238E27FC236}">
+                <a16:creationId xmlns:a16="http://schemas.microsoft.com/office/drawing/2014/main" id="{1E7A19A2-50EF-448F-A35D-815D8C7993E7}"/>
+              </a:ext>
+            </a:extLst>
+          </p:cNvPr>
+          <p:cNvPicPr>
+            <a:picLocks noChangeAspect="1"/>
+          </p:cNvPicPr>
+          <p:nvPr/>
+        </p:nvPicPr>
+        <p:blipFill>
+          <a:blip r:embed="rId2"/>
+          <a:stretch>
+            <a:fillRect/>
+          </a:stretch>
+        </p:blipFill>
+        <p:spPr>
+          <a:xfrm>
+            <a:off x="3238500" y="1378721"/>
+            <a:ext cx="4911201" cy="4903016"/>
+          </a:xfrm>
+          <a:prstGeom prst="rect">
+            <a:avLst/>
+          </a:prstGeom>
+        </p:spPr>
+      </p:pic>
+    </p:spTree>
+    <p:extLst>
+      <p:ext uri="{BB962C8B-B14F-4D97-AF65-F5344CB8AC3E}">
+        <p14:creationId xmlns:p14="http://schemas.microsoft.com/office/powerpoint/2010/main" val="3922642333"/>
+      </p:ext>
+    </p:extLst>
+  </p:cSld>
+  <p:clrMapOvr>
+    <a:masterClrMapping/>
+  </p:clrMapOvr>
+</p:sld>
+</file>
+
+<file path=ppt/slides/slide14.xml><?xml version="1.0" encoding="utf-8"?>
+<p:sld xmlns:a="http://schemas.openxmlformats.org/drawingml/2006/main" xmlns:r="http://schemas.openxmlformats.org/officeDocument/2006/relationships" xmlns:p="http://schemas.openxmlformats.org/presentationml/2006/main">
+  <p:cSld>
+    <p:spTree>
+      <p:nvGrpSpPr>
+        <p:cNvPr id="1" name=""/>
+        <p:cNvGrpSpPr/>
+        <p:nvPr/>
+      </p:nvGrpSpPr>
+      <p:grpSpPr>
+        <a:xfrm>
+          <a:off x="0" y="0"/>
+          <a:ext cx="0" cy="0"/>
+          <a:chOff x="0" y="0"/>
+          <a:chExt cx="0" cy="0"/>
+        </a:xfrm>
+      </p:grpSpPr>
+      <p:sp>
+        <p:nvSpPr>
+          <p:cNvPr id="2" name="כותרת 1">
+            <a:extLst>
+              <a:ext uri="{FF2B5EF4-FFF2-40B4-BE49-F238E27FC236}">
+                <a16:creationId xmlns:a16="http://schemas.microsoft.com/office/drawing/2014/main" id="{8B6FA5E4-5DE8-4151-B116-721BDBBDD21A}"/>
+              </a:ext>
+            </a:extLst>
+          </p:cNvPr>
+          <p:cNvSpPr>
+            <a:spLocks noGrp="1"/>
+          </p:cNvSpPr>
+          <p:nvPr>
+            <p:ph type="title"/>
+          </p:nvPr>
+        </p:nvSpPr>
+        <p:spPr>
+          <a:xfrm>
+            <a:off x="3354191" y="0"/>
+            <a:ext cx="8837809" cy="621792"/>
+          </a:xfrm>
+        </p:spPr>
+        <p:txBody>
+          <a:bodyPr>
+            <a:normAutofit fontScale="90000"/>
+          </a:bodyPr>
+          <a:lstStyle/>
+          <a:p>
+            <a:pPr algn="r"/>
+            <a:r>
+              <a:rPr lang="he-IL" dirty="0"/>
+              <a:t>היכרות עם הנתונים</a:t>
+            </a:r>
+          </a:p>
+        </p:txBody>
+      </p:sp>
+      <p:sp>
+        <p:nvSpPr>
+          <p:cNvPr id="3" name="מציין מיקום תוכן 2">
+            <a:extLst>
+              <a:ext uri="{FF2B5EF4-FFF2-40B4-BE49-F238E27FC236}">
+                <a16:creationId xmlns:a16="http://schemas.microsoft.com/office/drawing/2014/main" id="{F503CA34-A7B7-401C-BF52-FF4FF88F04B5}"/>
+              </a:ext>
+            </a:extLst>
+          </p:cNvPr>
+          <p:cNvSpPr>
+            <a:spLocks noGrp="1"/>
+          </p:cNvSpPr>
+          <p:nvPr>
+            <p:ph idx="1"/>
+          </p:nvPr>
+        </p:nvSpPr>
+        <p:spPr>
+          <a:xfrm>
+            <a:off x="-2214981" y="127982"/>
+            <a:ext cx="9592411" cy="621792"/>
+          </a:xfrm>
+        </p:spPr>
+        <p:txBody>
+          <a:bodyPr/>
+          <a:lstStyle/>
+          <a:p>
+            <a:r>
+              <a:rPr lang="he-IL" dirty="0"/>
+              <a:t>צפיפות כמות פנויות לפי סוג קטגוריה</a:t>
+            </a:r>
+          </a:p>
+        </p:txBody>
+      </p:sp>
+      <p:pic>
+        <p:nvPicPr>
+          <p:cNvPr id="5" name="תמונה 4">
+            <a:extLst>
+              <a:ext uri="{FF2B5EF4-FFF2-40B4-BE49-F238E27FC236}">
+                <a16:creationId xmlns:a16="http://schemas.microsoft.com/office/drawing/2014/main" id="{1DDEA10F-051D-4D12-AC88-8B4AFB462D2C}"/>
+              </a:ext>
+            </a:extLst>
+          </p:cNvPr>
+          <p:cNvPicPr>
+            <a:picLocks noChangeAspect="1"/>
+          </p:cNvPicPr>
+          <p:nvPr/>
+        </p:nvPicPr>
+        <p:blipFill>
+          <a:blip r:embed="rId2"/>
+          <a:stretch>
+            <a:fillRect/>
+          </a:stretch>
+        </p:blipFill>
+        <p:spPr>
+          <a:xfrm>
+            <a:off x="157482" y="574595"/>
+            <a:ext cx="10930728" cy="6283406"/>
+          </a:xfrm>
+          <a:prstGeom prst="rect">
+            <a:avLst/>
+          </a:prstGeom>
+        </p:spPr>
+      </p:pic>
+    </p:spTree>
+    <p:extLst>
+      <p:ext uri="{BB962C8B-B14F-4D97-AF65-F5344CB8AC3E}">
+        <p14:creationId xmlns:p14="http://schemas.microsoft.com/office/powerpoint/2010/main" val="1159169402"/>
       </p:ext>
     </p:extLst>
   </p:cSld>
@@ -4758,7 +5065,15 @@
             </a:pPr>
             <a:r>
               <a:rPr lang="he-IL" dirty="0"/>
-              <a:t>הורדת סוגי אירוע שהם טכניים – הורדת סוגי האירוע הבאים :</a:t>
+              <a:t>הורדת סוגי אירוע שהם טכניים – לא סווגו בקטגוריה </a:t>
+            </a:r>
+            <a:r>
+              <a:rPr lang="he-IL" dirty="0" err="1"/>
+              <a:t>מסויימת</a:t>
+            </a:r>
+            <a:r>
+              <a:rPr lang="he-IL" dirty="0"/>
+              <a:t>  כפעולה ע"י המוקד –סוגי האירוע הבאים:</a:t>
             </a:r>
           </a:p>
           <a:p>
@@ -4956,7 +5271,7 @@
             </a:pPr>
             <a:r>
               <a:rPr lang="he-IL" dirty="0"/>
-              <a:t>תיאור פעולה</a:t>
+              <a:t>תיאור פעולה  - קיימות 761 רשומות ללא תיאור פעולה.</a:t>
             </a:r>
           </a:p>
           <a:p>
@@ -4975,8 +5290,13 @@
             </a:pPr>
             <a:r>
               <a:rPr lang="he-IL" dirty="0"/>
-              <a:t>מחיקת עמודות</a:t>
-            </a:r>
+              <a:t>מחיקת </a:t>
+            </a:r>
+            <a:r>
+              <a:rPr lang="he-IL" dirty="0" err="1"/>
+              <a:t>עמ</a:t>
+            </a:r>
+            <a:endParaRPr lang="he-IL" dirty="0"/>
           </a:p>
           <a:p>
             <a:endParaRPr lang="he-IL" dirty="0"/>
@@ -5029,6 +5349,184 @@
             <p:ph type="title"/>
           </p:nvPr>
         </p:nvSpPr>
+        <p:spPr/>
+        <p:txBody>
+          <a:bodyPr/>
+          <a:lstStyle/>
+          <a:p>
+            <a:pPr algn="r"/>
+            <a:r>
+              <a:rPr lang="he-IL" dirty="0"/>
+              <a:t>היכרות עם הנתונים</a:t>
+            </a:r>
+          </a:p>
+        </p:txBody>
+      </p:sp>
+      <p:sp>
+        <p:nvSpPr>
+          <p:cNvPr id="3" name="מציין מיקום תוכן 2">
+            <a:extLst>
+              <a:ext uri="{FF2B5EF4-FFF2-40B4-BE49-F238E27FC236}">
+                <a16:creationId xmlns:a16="http://schemas.microsoft.com/office/drawing/2014/main" id="{F503CA34-A7B7-401C-BF52-FF4FF88F04B5}"/>
+              </a:ext>
+            </a:extLst>
+          </p:cNvPr>
+          <p:cNvSpPr>
+            <a:spLocks noGrp="1"/>
+          </p:cNvSpPr>
+          <p:nvPr>
+            <p:ph idx="1"/>
+          </p:nvPr>
+        </p:nvSpPr>
+        <p:spPr>
+          <a:xfrm>
+            <a:off x="1282912" y="1677525"/>
+            <a:ext cx="10058400" cy="4050792"/>
+          </a:xfrm>
+        </p:spPr>
+        <p:txBody>
+          <a:bodyPr>
+            <a:normAutofit/>
+          </a:bodyPr>
+          <a:lstStyle/>
+          <a:p>
+            <a:pPr>
+              <a:lnSpc>
+                <a:spcPct val="110000"/>
+              </a:lnSpc>
+            </a:pPr>
+            <a:r>
+              <a:rPr lang="he-IL" dirty="0"/>
+              <a:t>פרופורציית הרשומות לפי מגדר בסט:</a:t>
+            </a:r>
+          </a:p>
+          <a:p>
+            <a:pPr>
+              <a:lnSpc>
+                <a:spcPct val="110000"/>
+              </a:lnSpc>
+            </a:pPr>
+            <a:endParaRPr lang="he-IL" dirty="0"/>
+          </a:p>
+          <a:p>
+            <a:pPr lvl="1">
+              <a:lnSpc>
+                <a:spcPct val="110000"/>
+              </a:lnSpc>
+            </a:pPr>
+            <a:endParaRPr lang="he-IL" dirty="0"/>
+          </a:p>
+          <a:p>
+            <a:endParaRPr lang="he-IL" dirty="0"/>
+          </a:p>
+        </p:txBody>
+      </p:sp>
+      <p:pic>
+        <p:nvPicPr>
+          <p:cNvPr id="4" name="מציין מיקום תוכן 4">
+            <a:extLst>
+              <a:ext uri="{FF2B5EF4-FFF2-40B4-BE49-F238E27FC236}">
+                <a16:creationId xmlns:a16="http://schemas.microsoft.com/office/drawing/2014/main" id="{EACEFD4E-D4DA-4AE7-AE2D-242B0EBC8888}"/>
+              </a:ext>
+            </a:extLst>
+          </p:cNvPr>
+          <p:cNvPicPr>
+            <a:picLocks noChangeAspect="1"/>
+          </p:cNvPicPr>
+          <p:nvPr/>
+        </p:nvPicPr>
+        <p:blipFill>
+          <a:blip r:embed="rId2"/>
+          <a:stretch>
+            <a:fillRect/>
+          </a:stretch>
+        </p:blipFill>
+        <p:spPr>
+          <a:xfrm>
+            <a:off x="688678" y="2512380"/>
+            <a:ext cx="5015904" cy="3402860"/>
+          </a:xfrm>
+          <a:prstGeom prst="rect">
+            <a:avLst/>
+          </a:prstGeom>
+        </p:spPr>
+      </p:pic>
+      <p:pic>
+        <p:nvPicPr>
+          <p:cNvPr id="5" name="תמונה 4">
+            <a:extLst>
+              <a:ext uri="{FF2B5EF4-FFF2-40B4-BE49-F238E27FC236}">
+                <a16:creationId xmlns:a16="http://schemas.microsoft.com/office/drawing/2014/main" id="{AD303918-C4F1-40DE-A176-4EFD72EB46FF}"/>
+              </a:ext>
+            </a:extLst>
+          </p:cNvPr>
+          <p:cNvPicPr>
+            <a:picLocks noChangeAspect="1"/>
+          </p:cNvPicPr>
+          <p:nvPr/>
+        </p:nvPicPr>
+        <p:blipFill>
+          <a:blip r:embed="rId3"/>
+          <a:stretch>
+            <a:fillRect/>
+          </a:stretch>
+        </p:blipFill>
+        <p:spPr>
+          <a:xfrm>
+            <a:off x="6201458" y="2392470"/>
+            <a:ext cx="4926790" cy="3642680"/>
+          </a:xfrm>
+          <a:prstGeom prst="rect">
+            <a:avLst/>
+          </a:prstGeom>
+        </p:spPr>
+      </p:pic>
+    </p:spTree>
+    <p:extLst>
+      <p:ext uri="{BB962C8B-B14F-4D97-AF65-F5344CB8AC3E}">
+        <p14:creationId xmlns:p14="http://schemas.microsoft.com/office/powerpoint/2010/main" val="2300717755"/>
+      </p:ext>
+    </p:extLst>
+  </p:cSld>
+  <p:clrMapOvr>
+    <a:masterClrMapping/>
+  </p:clrMapOvr>
+</p:sld>
+</file>
+
+<file path=ppt/slides/slide7.xml><?xml version="1.0" encoding="utf-8"?>
+<p:sld xmlns:a="http://schemas.openxmlformats.org/drawingml/2006/main" xmlns:r="http://schemas.openxmlformats.org/officeDocument/2006/relationships" xmlns:p="http://schemas.openxmlformats.org/presentationml/2006/main">
+  <p:cSld>
+    <p:spTree>
+      <p:nvGrpSpPr>
+        <p:cNvPr id="1" name=""/>
+        <p:cNvGrpSpPr/>
+        <p:nvPr/>
+      </p:nvGrpSpPr>
+      <p:grpSpPr>
+        <a:xfrm>
+          <a:off x="0" y="0"/>
+          <a:ext cx="0" cy="0"/>
+          <a:chOff x="0" y="0"/>
+          <a:chExt cx="0" cy="0"/>
+        </a:xfrm>
+      </p:grpSpPr>
+      <p:sp>
+        <p:nvSpPr>
+          <p:cNvPr id="2" name="כותרת 1">
+            <a:extLst>
+              <a:ext uri="{FF2B5EF4-FFF2-40B4-BE49-F238E27FC236}">
+                <a16:creationId xmlns:a16="http://schemas.microsoft.com/office/drawing/2014/main" id="{8B6FA5E4-5DE8-4151-B116-721BDBBDD21A}"/>
+              </a:ext>
+            </a:extLst>
+          </p:cNvPr>
+          <p:cNvSpPr>
+            <a:spLocks noGrp="1"/>
+          </p:cNvSpPr>
+          <p:nvPr>
+            <p:ph type="title"/>
+          </p:nvPr>
+        </p:nvSpPr>
         <p:spPr>
           <a:xfrm>
             <a:off x="1655774" y="-269969"/>
@@ -5231,154 +5729,6 @@
     <p:extLst>
       <p:ext uri="{BB962C8B-B14F-4D97-AF65-F5344CB8AC3E}">
         <p14:creationId xmlns:p14="http://schemas.microsoft.com/office/powerpoint/2010/main" val="1198579764"/>
-      </p:ext>
-    </p:extLst>
-  </p:cSld>
-  <p:clrMapOvr>
-    <a:masterClrMapping/>
-  </p:clrMapOvr>
-</p:sld>
-</file>
-
-<file path=ppt/slides/slide7.xml><?xml version="1.0" encoding="utf-8"?>
-<p:sld xmlns:a="http://schemas.openxmlformats.org/drawingml/2006/main" xmlns:r="http://schemas.openxmlformats.org/officeDocument/2006/relationships" xmlns:p="http://schemas.openxmlformats.org/presentationml/2006/main">
-  <p:cSld>
-    <p:spTree>
-      <p:nvGrpSpPr>
-        <p:cNvPr id="1" name=""/>
-        <p:cNvGrpSpPr/>
-        <p:nvPr/>
-      </p:nvGrpSpPr>
-      <p:grpSpPr>
-        <a:xfrm>
-          <a:off x="0" y="0"/>
-          <a:ext cx="0" cy="0"/>
-          <a:chOff x="0" y="0"/>
-          <a:chExt cx="0" cy="0"/>
-        </a:xfrm>
-      </p:grpSpPr>
-      <p:sp>
-        <p:nvSpPr>
-          <p:cNvPr id="2" name="כותרת 1">
-            <a:extLst>
-              <a:ext uri="{FF2B5EF4-FFF2-40B4-BE49-F238E27FC236}">
-                <a16:creationId xmlns:a16="http://schemas.microsoft.com/office/drawing/2014/main" id="{8B6FA5E4-5DE8-4151-B116-721BDBBDD21A}"/>
-              </a:ext>
-            </a:extLst>
-          </p:cNvPr>
-          <p:cNvSpPr>
-            <a:spLocks noGrp="1"/>
-          </p:cNvSpPr>
-          <p:nvPr>
-            <p:ph type="title"/>
-          </p:nvPr>
-        </p:nvSpPr>
-        <p:spPr/>
-        <p:txBody>
-          <a:bodyPr/>
-          <a:lstStyle/>
-          <a:p>
-            <a:pPr algn="r"/>
-            <a:r>
-              <a:rPr lang="he-IL" dirty="0"/>
-              <a:t>היכרות עם הנתונים</a:t>
-            </a:r>
-          </a:p>
-        </p:txBody>
-      </p:sp>
-      <p:sp>
-        <p:nvSpPr>
-          <p:cNvPr id="3" name="מציין מיקום תוכן 2">
-            <a:extLst>
-              <a:ext uri="{FF2B5EF4-FFF2-40B4-BE49-F238E27FC236}">
-                <a16:creationId xmlns:a16="http://schemas.microsoft.com/office/drawing/2014/main" id="{F503CA34-A7B7-401C-BF52-FF4FF88F04B5}"/>
-              </a:ext>
-            </a:extLst>
-          </p:cNvPr>
-          <p:cNvSpPr>
-            <a:spLocks noGrp="1"/>
-          </p:cNvSpPr>
-          <p:nvPr>
-            <p:ph idx="1"/>
-          </p:nvPr>
-        </p:nvSpPr>
-        <p:spPr>
-          <a:xfrm>
-            <a:off x="1282912" y="1677525"/>
-            <a:ext cx="10058400" cy="4050792"/>
-          </a:xfrm>
-        </p:spPr>
-        <p:txBody>
-          <a:bodyPr>
-            <a:normAutofit/>
-          </a:bodyPr>
-          <a:lstStyle/>
-          <a:p>
-            <a:pPr>
-              <a:lnSpc>
-                <a:spcPct val="110000"/>
-              </a:lnSpc>
-            </a:pPr>
-            <a:r>
-              <a:rPr lang="he-IL" dirty="0"/>
-              <a:t>פרופורציית הרשומות לפי מגדר בסט:</a:t>
-            </a:r>
-          </a:p>
-          <a:p>
-            <a:pPr>
-              <a:lnSpc>
-                <a:spcPct val="110000"/>
-              </a:lnSpc>
-            </a:pPr>
-            <a:endParaRPr lang="he-IL" dirty="0"/>
-          </a:p>
-          <a:p>
-            <a:pPr lvl="1">
-              <a:lnSpc>
-                <a:spcPct val="110000"/>
-              </a:lnSpc>
-            </a:pPr>
-            <a:endParaRPr lang="he-IL" dirty="0"/>
-          </a:p>
-          <a:p>
-            <a:endParaRPr lang="he-IL" dirty="0"/>
-          </a:p>
-        </p:txBody>
-      </p:sp>
-      <p:pic>
-        <p:nvPicPr>
-          <p:cNvPr id="4" name="מציין מיקום תוכן 4">
-            <a:extLst>
-              <a:ext uri="{FF2B5EF4-FFF2-40B4-BE49-F238E27FC236}">
-                <a16:creationId xmlns:a16="http://schemas.microsoft.com/office/drawing/2014/main" id="{EACEFD4E-D4DA-4AE7-AE2D-242B0EBC8888}"/>
-              </a:ext>
-            </a:extLst>
-          </p:cNvPr>
-          <p:cNvPicPr>
-            <a:picLocks noChangeAspect="1"/>
-          </p:cNvPicPr>
-          <p:nvPr/>
-        </p:nvPicPr>
-        <p:blipFill>
-          <a:blip r:embed="rId2"/>
-          <a:stretch>
-            <a:fillRect/>
-          </a:stretch>
-        </p:blipFill>
-        <p:spPr>
-          <a:xfrm>
-            <a:off x="3245446" y="2210540"/>
-            <a:ext cx="5015904" cy="3402860"/>
-          </a:xfrm>
-          <a:prstGeom prst="rect">
-            <a:avLst/>
-          </a:prstGeom>
-        </p:spPr>
-      </p:pic>
-    </p:spTree>
-    <p:extLst>
-      <p:ext uri="{BB962C8B-B14F-4D97-AF65-F5344CB8AC3E}">
-        <p14:creationId xmlns:p14="http://schemas.microsoft.com/office/powerpoint/2010/main" val="2300717755"/>
       </p:ext>
     </p:extLst>
   </p:cSld>

</xml_diff>